<commit_message>
final version (slides for meeting)
</commit_message>
<xml_diff>
--- a/מפגש אמצע.pptx
+++ b/מפגש אמצע.pptx
@@ -702,7 +702,7 @@
           <a:p>
             <a:fld id="{DAE672F7-6408-455E-B58A-00240CB3F696}" type="datetimeFigureOut">
               <a:rPr lang="en-IL" smtClean="0"/>
-              <a:t>08/03/2022</a:t>
+              <a:t>03/08/2022</a:t>
             </a:fld>
             <a:endParaRPr lang="en-IL"/>
           </a:p>
@@ -902,7 +902,7 @@
           <a:p>
             <a:fld id="{DAE672F7-6408-455E-B58A-00240CB3F696}" type="datetimeFigureOut">
               <a:rPr lang="en-IL" smtClean="0"/>
-              <a:t>08/03/2022</a:t>
+              <a:t>03/08/2022</a:t>
             </a:fld>
             <a:endParaRPr lang="en-IL"/>
           </a:p>
@@ -1112,7 +1112,7 @@
           <a:p>
             <a:fld id="{DAE672F7-6408-455E-B58A-00240CB3F696}" type="datetimeFigureOut">
               <a:rPr lang="en-IL" smtClean="0"/>
-              <a:t>08/03/2022</a:t>
+              <a:t>03/08/2022</a:t>
             </a:fld>
             <a:endParaRPr lang="en-IL"/>
           </a:p>
@@ -1312,7 +1312,7 @@
           <a:p>
             <a:fld id="{DAE672F7-6408-455E-B58A-00240CB3F696}" type="datetimeFigureOut">
               <a:rPr lang="en-IL" smtClean="0"/>
-              <a:t>08/03/2022</a:t>
+              <a:t>03/08/2022</a:t>
             </a:fld>
             <a:endParaRPr lang="en-IL"/>
           </a:p>
@@ -1588,7 +1588,7 @@
           <a:p>
             <a:fld id="{DAE672F7-6408-455E-B58A-00240CB3F696}" type="datetimeFigureOut">
               <a:rPr lang="en-IL" smtClean="0"/>
-              <a:t>08/03/2022</a:t>
+              <a:t>03/08/2022</a:t>
             </a:fld>
             <a:endParaRPr lang="en-IL"/>
           </a:p>
@@ -1856,7 +1856,7 @@
           <a:p>
             <a:fld id="{DAE672F7-6408-455E-B58A-00240CB3F696}" type="datetimeFigureOut">
               <a:rPr lang="en-IL" smtClean="0"/>
-              <a:t>08/03/2022</a:t>
+              <a:t>03/08/2022</a:t>
             </a:fld>
             <a:endParaRPr lang="en-IL"/>
           </a:p>
@@ -2271,7 +2271,7 @@
           <a:p>
             <a:fld id="{DAE672F7-6408-455E-B58A-00240CB3F696}" type="datetimeFigureOut">
               <a:rPr lang="en-IL" smtClean="0"/>
-              <a:t>08/03/2022</a:t>
+              <a:t>03/08/2022</a:t>
             </a:fld>
             <a:endParaRPr lang="en-IL"/>
           </a:p>
@@ -2413,7 +2413,7 @@
           <a:p>
             <a:fld id="{DAE672F7-6408-455E-B58A-00240CB3F696}" type="datetimeFigureOut">
               <a:rPr lang="en-IL" smtClean="0"/>
-              <a:t>08/03/2022</a:t>
+              <a:t>03/08/2022</a:t>
             </a:fld>
             <a:endParaRPr lang="en-IL"/>
           </a:p>
@@ -2526,7 +2526,7 @@
           <a:p>
             <a:fld id="{DAE672F7-6408-455E-B58A-00240CB3F696}" type="datetimeFigureOut">
               <a:rPr lang="en-IL" smtClean="0"/>
-              <a:t>08/03/2022</a:t>
+              <a:t>03/08/2022</a:t>
             </a:fld>
             <a:endParaRPr lang="en-IL"/>
           </a:p>
@@ -2839,7 +2839,7 @@
           <a:p>
             <a:fld id="{DAE672F7-6408-455E-B58A-00240CB3F696}" type="datetimeFigureOut">
               <a:rPr lang="en-IL" smtClean="0"/>
-              <a:t>08/03/2022</a:t>
+              <a:t>03/08/2022</a:t>
             </a:fld>
             <a:endParaRPr lang="en-IL"/>
           </a:p>
@@ -3128,7 +3128,7 @@
           <a:p>
             <a:fld id="{DAE672F7-6408-455E-B58A-00240CB3F696}" type="datetimeFigureOut">
               <a:rPr lang="en-IL" smtClean="0"/>
-              <a:t>08/03/2022</a:t>
+              <a:t>03/08/2022</a:t>
             </a:fld>
             <a:endParaRPr lang="en-IL"/>
           </a:p>
@@ -3371,7 +3371,7 @@
           <a:p>
             <a:fld id="{DAE672F7-6408-455E-B58A-00240CB3F696}" type="datetimeFigureOut">
               <a:rPr lang="en-IL" smtClean="0"/>
-              <a:t>08/03/2022</a:t>
+              <a:t>03/08/2022</a:t>
             </a:fld>
             <a:endParaRPr lang="en-IL"/>
           </a:p>
@@ -4003,7 +4003,7 @@
             </a:r>
             <a:r>
               <a:rPr lang="he-IL" sz="2400" dirty="0"/>
-              <a:t> בעזרת מודל כזה.</a:t>
+              <a:t> המופיע באלגוריתם שנכתב במחקר של סיימון, בעזרת מודל המוצא חסם אופטימלי בהינתן תמונה.</a:t>
             </a:r>
           </a:p>
           <a:p>
@@ -4012,7 +4012,7 @@
             </a:pPr>
             <a:r>
               <a:rPr lang="he-IL" sz="2400" dirty="0"/>
-              <a:t>החסמים באלגוריתם זה לקביעת סדר החיפוש והערכת הפתרון האופטימלי של תתי מרחבים, נקבעים לרוב באופן ידני שיתאימו לבעיות ספציפיות.</a:t>
+              <a:t>החסמים באלגוריתם זה לקביעת סדר החיפוש והערכת הפתרון האופטימלי של תתי מרחבים, נקבעים לרוב באופן ידני על ידי ניסוי וטעיה כך שיתאימו לבעיות ספציפיות.</a:t>
             </a:r>
           </a:p>
           <a:p>
@@ -4501,29 +4501,21 @@
             <a:pPr algn="r" rtl="1"/>
             <a:r>
               <a:rPr lang="he-IL" dirty="0"/>
-              <a:t>לבנות מסד נתונים שיחזיק לנו המון תמונות ותבנית לכל תמונה, שישמש אותנו כדוגמאות בשלב האחרון.</a:t>
+              <a:t>לבנות מסד נתונים שישמש אותנו כדוגמאות ללמידה בשלב האחרון.</a:t>
             </a:r>
           </a:p>
           <a:p>
             <a:pPr algn="r" rtl="1"/>
             <a:r>
               <a:rPr lang="he-IL" dirty="0"/>
-              <a:t>לחקור על מודלים של למידה עמוקה ולהבין בדיוק איך לממש את זה ב- </a:t>
-            </a:r>
-            <a:r>
-              <a:rPr lang="en-US" dirty="0"/>
-              <a:t>Python</a:t>
-            </a:r>
+              <a:t>לחקור על מודלים של למידה עמוקה ולהבין איזה מודל מתאים לבעיה ואיך לממש אותו בפרויקט שלנו.</a:t>
+            </a:r>
+          </a:p>
+          <a:p>
+            <a:pPr algn="r" rtl="1"/>
             <a:r>
               <a:rPr lang="he-IL" dirty="0"/>
-              <a:t>.</a:t>
-            </a:r>
-          </a:p>
-          <a:p>
-            <a:pPr algn="r" rtl="1"/>
-            <a:r>
-              <a:rPr lang="he-IL" dirty="0"/>
-              <a:t>להריץ את המערכת למידה ולשנות דברים עד לתוצאה מספקת</a:t>
+              <a:t>להריץ את מערכת הלמידה עד לתוצאה מספקת.</a:t>
             </a:r>
             <a:endParaRPr lang="en-IL" dirty="0"/>
           </a:p>
@@ -4626,15 +4618,16 @@
               <a:t> – </a:t>
             </a:r>
             <a:r>
-              <a:rPr lang="he-IL" i="1" dirty="0"/>
-              <a:t>כמה שבועות</a:t>
-            </a:r>
+              <a:rPr lang="he-IL" i="1"/>
+              <a:t>כמה שבועות.</a:t>
+            </a:r>
+            <a:endParaRPr lang="he-IL" i="1" dirty="0"/>
           </a:p>
           <a:p>
             <a:pPr lvl="1" algn="r" rtl="1"/>
             <a:r>
               <a:rPr lang="he-IL" dirty="0"/>
-              <a:t>מימוש קוד קריא, נגיש המכיל את הדוגמאות מהמאמר (צריך להראות כי בכל הדוגמאות מתקבלות תוצאות טובות)</a:t>
+              <a:t>מימוש קוד קריא, נגיש המכיל את הדוגמאות מהמאמר (צריך להראות כי בכל הדוגמאות מתקבלות תוצאות זהות לקוד המקורי).</a:t>
             </a:r>
           </a:p>
           <a:p>
@@ -4645,21 +4638,17 @@
             </a:r>
             <a:r>
               <a:rPr lang="he-IL" i="1" dirty="0"/>
-              <a:t>מספר שבועות</a:t>
+              <a:t>מספר שבועות.</a:t>
             </a:r>
           </a:p>
           <a:p>
             <a:pPr algn="r" rtl="1"/>
             <a:r>
               <a:rPr lang="he-IL" dirty="0"/>
-              <a:t>במקביל הקמת מסד נתונים לדוגמאות של תמונה ותבנית </a:t>
-            </a:r>
-            <a:r>
-              <a:rPr lang="he-IL"/>
-              <a:t>– </a:t>
-            </a:r>
-            <a:r>
-              <a:rPr lang="he-IL" i="1"/>
+              <a:t>במקביל הקמת מסד נתונים לדוגמאות של תמונה ותבנית – </a:t>
+            </a:r>
+            <a:r>
+              <a:rPr lang="he-IL" i="1" dirty="0"/>
               <a:t>מספר שבועות</a:t>
             </a:r>
             <a:endParaRPr lang="he-IL" dirty="0"/>
@@ -4672,14 +4661,14 @@
             </a:r>
             <a:r>
               <a:rPr lang="he-IL" i="1" dirty="0"/>
-              <a:t>3-4 חודשים (עד ההגשה)</a:t>
+              <a:t>3-4 חודשים (עד ההגשה).</a:t>
             </a:r>
           </a:p>
           <a:p>
             <a:pPr lvl="1" algn="r" rtl="1"/>
             <a:r>
               <a:rPr lang="he-IL" dirty="0"/>
-              <a:t>החלוקה של שלב זה תתבסס על התכנון שנבצע יחד עם סיימון</a:t>
+              <a:t>החלוקה של שלב זה תתבסס על התכנון שנבצע יחד עם סיימון.</a:t>
             </a:r>
             <a:endParaRPr lang="en-IL" dirty="0"/>
           </a:p>

</xml_diff>